<commit_message>
Update ES Definite Guide
</commit_message>
<xml_diff>
--- a/ES Definite Guide.pptx
+++ b/ES Definite Guide.pptx
@@ -19,10 +19,10 @@
     <p:sldId id="277" r:id="rId13"/>
     <p:sldId id="278" r:id="rId14"/>
     <p:sldId id="270" r:id="rId15"/>
-    <p:sldId id="273" r:id="rId16"/>
-    <p:sldId id="274" r:id="rId17"/>
-    <p:sldId id="276" r:id="rId18"/>
-    <p:sldId id="275" r:id="rId19"/>
+    <p:sldId id="279" r:id="rId16"/>
+    <p:sldId id="276" r:id="rId17"/>
+    <p:sldId id="273" r:id="rId18"/>
+    <p:sldId id="274" r:id="rId19"/>
     <p:sldId id="268" r:id="rId20"/>
     <p:sldId id="260" r:id="rId21"/>
     <p:sldId id="257" r:id="rId22"/>
@@ -3031,7 +3031,7 @@
         </p:spPr>
         <p:txBody>
           <a:bodyPr>
-            <a:normAutofit fontScale="85000" lnSpcReduction="10000"/>
+            <a:normAutofit fontScale="77500" lnSpcReduction="20000"/>
           </a:bodyPr>
           <a:lstStyle/>
           <a:p>
@@ -3092,12 +3092,19 @@
               <a:t>Elasticsearch</a:t>
             </a:r>
             <a:r>
-              <a:rPr lang="en-US" i="1" smtClean="0"/>
-              <a:t> Official Online </a:t>
-            </a:r>
-            <a:r>
               <a:rPr lang="en-US" i="1" dirty="0" smtClean="0"/>
-              <a:t>Reference Document</a:t>
+              <a:t> Official Online Reference </a:t>
+            </a:r>
+            <a:r>
+              <a:rPr lang="en-US" i="1" dirty="0" smtClean="0"/>
+              <a:t>Document</a:t>
+            </a:r>
+          </a:p>
+          <a:p>
+            <a:pPr algn="l"/>
+            <a:r>
+              <a:rPr lang="en-US" i="1" dirty="0" smtClean="0"/>
+              <a:t>[3] Philips, SMU LARC</a:t>
             </a:r>
             <a:endParaRPr lang="en-SG" i="1" dirty="0"/>
           </a:p>
@@ -3971,7 +3978,11 @@
           <a:p>
             <a:r>
               <a:rPr lang="en-US" dirty="0" smtClean="0"/>
-              <a:t>Rolling Index</a:t>
+              <a:t>Rolling </a:t>
+            </a:r>
+            <a:r>
+              <a:rPr lang="en-US" dirty="0" smtClean="0"/>
+              <a:t>Index (I)</a:t>
             </a:r>
             <a:endParaRPr lang="en-SG" dirty="0"/>
           </a:p>
@@ -3992,7 +4003,23 @@
           <a:bodyPr/>
           <a:lstStyle/>
           <a:p>
-            <a:endParaRPr lang="en-SG"/>
+            <a:r>
+              <a:rPr lang="en-US" dirty="0" smtClean="0"/>
+              <a:t>This is more for maintenance, house keeping and performance purposes</a:t>
+            </a:r>
+          </a:p>
+          <a:p>
+            <a:r>
+              <a:rPr lang="en-US" dirty="0" smtClean="0"/>
+              <a:t>E.g. each index may be set to prefix with a specific date format that represent the current year &amp; current month. Then all documents of that current year &amp; current month will be stored in that particular index.</a:t>
+            </a:r>
+          </a:p>
+          <a:p>
+            <a:r>
+              <a:rPr lang="en-US" dirty="0" smtClean="0"/>
+              <a:t>You can perform rolling indices manually or you can do it automatically</a:t>
+            </a:r>
+            <a:endParaRPr lang="en-SG" dirty="0"/>
           </a:p>
         </p:txBody>
       </p:sp>
@@ -4043,7 +4070,7 @@
           <a:p>
             <a:r>
               <a:rPr lang="en-US" dirty="0" smtClean="0"/>
-              <a:t>Creating Snapshots and Restore</a:t>
+              <a:t>Rolling Index (II)</a:t>
             </a:r>
             <a:endParaRPr lang="en-SG" dirty="0"/>
           </a:p>
@@ -4061,204 +4088,27 @@
         </p:nvSpPr>
         <p:spPr/>
         <p:txBody>
-          <a:bodyPr>
-            <a:normAutofit fontScale="92500" lnSpcReduction="10000"/>
-          </a:bodyPr>
-          <a:lstStyle/>
-          <a:p>
-            <a:r>
-              <a:rPr lang="en-US" dirty="0" smtClean="0"/>
-              <a:t>Edit the shared filesystem (where snapshots are stored)</a:t>
-            </a:r>
-          </a:p>
-          <a:p>
-            <a:pPr marL="0" indent="0">
-              <a:buNone/>
-            </a:pPr>
-            <a:r>
-              <a:rPr lang="en-SG" sz="1200" dirty="0" err="1" smtClean="0"/>
-              <a:t>elasticsearch.yml</a:t>
-            </a:r>
-            <a:r>
-              <a:rPr lang="en-SG" sz="1200" dirty="0" smtClean="0"/>
-              <a:t> – </a:t>
-            </a:r>
-            <a:r>
-              <a:rPr lang="en-SG" sz="1200" dirty="0" err="1" smtClean="0"/>
-              <a:t>path.repo</a:t>
-            </a:r>
-            <a:r>
-              <a:rPr lang="en-SG" sz="1200" dirty="0"/>
-              <a:t>: ["/mount/backups", "/mount/</a:t>
-            </a:r>
-            <a:r>
-              <a:rPr lang="en-SG" sz="1200" dirty="0" err="1"/>
-              <a:t>longterm_backups</a:t>
-            </a:r>
-            <a:r>
-              <a:rPr lang="en-SG" sz="1200" dirty="0" smtClean="0"/>
-              <a:t>"]</a:t>
-            </a:r>
-            <a:endParaRPr lang="en-US" sz="1200" dirty="0" smtClean="0"/>
-          </a:p>
-          <a:p>
-            <a:r>
-              <a:rPr lang="en-US" dirty="0" smtClean="0"/>
-              <a:t>Register the shared filesystem with the snapshot</a:t>
-            </a:r>
-          </a:p>
-          <a:p>
-            <a:pPr marL="0" indent="0">
-              <a:buNone/>
-            </a:pPr>
-            <a:r>
-              <a:rPr lang="en-SG" sz="1300" dirty="0" smtClean="0"/>
-              <a:t>PUT /_snapshot/</a:t>
-            </a:r>
-            <a:r>
-              <a:rPr lang="en-SG" sz="1300" dirty="0" err="1" smtClean="0"/>
-              <a:t>my_backup</a:t>
-            </a:r>
-            <a:endParaRPr lang="en-SG" sz="1300" dirty="0" smtClean="0"/>
-          </a:p>
-          <a:p>
-            <a:pPr marL="0" indent="0">
-              <a:buNone/>
-            </a:pPr>
-            <a:r>
-              <a:rPr lang="en-SG" sz="1300" dirty="0" smtClean="0"/>
-              <a:t> { </a:t>
-            </a:r>
-            <a:r>
-              <a:rPr lang="en-SG" sz="1300" dirty="0"/>
-              <a:t>"type": "fs", </a:t>
-            </a:r>
-            <a:endParaRPr lang="en-SG" sz="1300" dirty="0" smtClean="0"/>
-          </a:p>
-          <a:p>
-            <a:pPr marL="0" indent="0">
-              <a:buNone/>
-            </a:pPr>
-            <a:r>
-              <a:rPr lang="en-SG" sz="1300" dirty="0"/>
-              <a:t> </a:t>
-            </a:r>
-            <a:r>
-              <a:rPr lang="en-SG" sz="1300" dirty="0" smtClean="0"/>
-              <a:t>   "</a:t>
-            </a:r>
-            <a:r>
-              <a:rPr lang="en-SG" sz="1300" dirty="0"/>
-              <a:t>settings": { </a:t>
-            </a:r>
-            <a:endParaRPr lang="en-SG" sz="1300" dirty="0" smtClean="0"/>
-          </a:p>
-          <a:p>
-            <a:pPr marL="0" indent="0">
-              <a:buNone/>
-            </a:pPr>
-            <a:r>
-              <a:rPr lang="en-SG" sz="1300" dirty="0"/>
-              <a:t> </a:t>
-            </a:r>
-            <a:r>
-              <a:rPr lang="en-SG" sz="1300" dirty="0" smtClean="0"/>
-              <a:t>       "</a:t>
-            </a:r>
-            <a:r>
-              <a:rPr lang="en-SG" sz="1300" dirty="0"/>
-              <a:t>location": "/mount/backups/</a:t>
-            </a:r>
-            <a:r>
-              <a:rPr lang="en-SG" sz="1300" dirty="0" err="1"/>
-              <a:t>my_backup</a:t>
-            </a:r>
-            <a:r>
-              <a:rPr lang="en-SG" sz="1300" dirty="0"/>
-              <a:t>", "compress": true </a:t>
-            </a:r>
-            <a:endParaRPr lang="en-SG" sz="1300" dirty="0" smtClean="0"/>
-          </a:p>
-          <a:p>
-            <a:pPr marL="0" indent="0">
-              <a:buNone/>
-            </a:pPr>
-            <a:r>
-              <a:rPr lang="en-SG" sz="1300" dirty="0"/>
-              <a:t> </a:t>
-            </a:r>
-            <a:r>
-              <a:rPr lang="en-SG" sz="1300" dirty="0" smtClean="0"/>
-              <a:t>     } </a:t>
-            </a:r>
-          </a:p>
-          <a:p>
-            <a:pPr marL="0" indent="0">
-              <a:buNone/>
-            </a:pPr>
-            <a:r>
-              <a:rPr lang="en-SG" sz="1300" dirty="0"/>
-              <a:t> </a:t>
-            </a:r>
-            <a:r>
-              <a:rPr lang="en-SG" sz="1300" dirty="0" smtClean="0"/>
-              <a:t> }</a:t>
-            </a:r>
-            <a:endParaRPr lang="en-US" sz="1300" dirty="0" smtClean="0"/>
-          </a:p>
-          <a:p>
-            <a:r>
-              <a:rPr lang="en-US" dirty="0" smtClean="0"/>
-              <a:t>Create the snapshot</a:t>
-            </a:r>
-          </a:p>
-          <a:p>
-            <a:pPr marL="0" indent="0">
-              <a:buNone/>
-            </a:pPr>
-            <a:r>
-              <a:rPr lang="en-SG" sz="1200" dirty="0"/>
-              <a:t>PUT /_snapshot/</a:t>
-            </a:r>
-            <a:r>
-              <a:rPr lang="en-SG" sz="1200" dirty="0" err="1"/>
-              <a:t>my_backup</a:t>
-            </a:r>
-            <a:r>
-              <a:rPr lang="en-SG" sz="1200" dirty="0"/>
-              <a:t>/snapshot_1?wait_for_completion=true</a:t>
-            </a:r>
-            <a:endParaRPr lang="en-US" sz="1200" dirty="0" smtClean="0"/>
-          </a:p>
-          <a:p>
-            <a:r>
-              <a:rPr lang="en-US" dirty="0" smtClean="0"/>
-              <a:t>Restore the snapshot</a:t>
-            </a:r>
-          </a:p>
-          <a:p>
-            <a:pPr marL="0" indent="0">
-              <a:buNone/>
-            </a:pPr>
-            <a:r>
-              <a:rPr lang="en-SG" sz="1200" dirty="0"/>
-              <a:t>POST /_snapshot/</a:t>
-            </a:r>
-            <a:r>
-              <a:rPr lang="en-SG" sz="1200" dirty="0" err="1"/>
-              <a:t>my_backup</a:t>
-            </a:r>
-            <a:r>
-              <a:rPr lang="en-SG" sz="1200" dirty="0"/>
-              <a:t>/snapshot_1/_restore</a:t>
-            </a:r>
+          <a:bodyPr/>
+          <a:lstStyle/>
+          <a:p>
+            <a:r>
+              <a:rPr lang="en-US" dirty="0" smtClean="0"/>
+              <a:t>Since indices will be created automatically when inserting an document if the indices do not exist, it is better to define the indices based on the timestamp of the document.</a:t>
+            </a:r>
+          </a:p>
+          <a:p>
+            <a:r>
+              <a:rPr lang="en-US" dirty="0" smtClean="0"/>
+              <a:t>E.g. if the document is created on Jan 2016, then the indices to place the document can be 01-2016. It will be created automatically if it does not exist. If the index exist, it will simply store this document in that index.</a:t>
+            </a:r>
+            <a:endParaRPr lang="en-SG" dirty="0"/>
           </a:p>
         </p:txBody>
       </p:sp>
     </p:spTree>
     <p:extLst>
       <p:ext uri="{BB962C8B-B14F-4D97-AF65-F5344CB8AC3E}">
-        <p14:creationId xmlns:p14="http://schemas.microsoft.com/office/powerpoint/2010/main" val="1029645993"/>
+        <p14:creationId xmlns:p14="http://schemas.microsoft.com/office/powerpoint/2010/main" val="501996477"/>
       </p:ext>
     </p:extLst>
   </p:cSld>
@@ -4302,7 +4152,7 @@
           <a:p>
             <a:r>
               <a:rPr lang="en-US" dirty="0" smtClean="0"/>
-              <a:t>Upgrading (from 1.x to 2.x)</a:t>
+              <a:t>Dynamic Templates</a:t>
             </a:r>
             <a:endParaRPr lang="en-SG" dirty="0"/>
           </a:p>
@@ -4325,9 +4175,229 @@
           </a:bodyPr>
           <a:lstStyle/>
           <a:p>
-            <a:r>
-              <a:rPr lang="en-US" dirty="0" smtClean="0"/>
-              <a:t>Disable shard allocation</a:t>
+            <a:pPr marL="0" indent="0">
+              <a:buNone/>
+            </a:pPr>
+            <a:r>
+              <a:rPr lang="en-SG" sz="1200" dirty="0" smtClean="0"/>
+              <a:t>PUT /</a:t>
+            </a:r>
+            <a:r>
+              <a:rPr lang="en-SG" sz="1200" dirty="0" err="1" smtClean="0"/>
+              <a:t>my_index</a:t>
+            </a:r>
+            <a:endParaRPr lang="en-SG" sz="1200" dirty="0" smtClean="0"/>
+          </a:p>
+          <a:p>
+            <a:pPr marL="0" indent="0">
+              <a:buNone/>
+            </a:pPr>
+            <a:r>
+              <a:rPr lang="en-SG" sz="1200" dirty="0" smtClean="0"/>
+              <a:t>{</a:t>
+            </a:r>
+          </a:p>
+          <a:p>
+            <a:pPr marL="0" indent="0">
+              <a:buNone/>
+            </a:pPr>
+            <a:r>
+              <a:rPr lang="en-SG" sz="1200" dirty="0" smtClean="0"/>
+              <a:t>"mappings": {</a:t>
+            </a:r>
+          </a:p>
+          <a:p>
+            <a:pPr marL="0" indent="0">
+              <a:buNone/>
+            </a:pPr>
+            <a:r>
+              <a:rPr lang="en-SG" sz="1200" dirty="0" smtClean="0"/>
+              <a:t>"</a:t>
+            </a:r>
+            <a:r>
+              <a:rPr lang="en-SG" sz="1200" dirty="0" err="1" smtClean="0">
+                <a:solidFill>
+                  <a:schemeClr val="accent6"/>
+                </a:solidFill>
+              </a:rPr>
+              <a:t>my_type</a:t>
+            </a:r>
+            <a:r>
+              <a:rPr lang="en-SG" sz="1200" dirty="0" smtClean="0"/>
+              <a:t>": {		</a:t>
+            </a:r>
+            <a:r>
+              <a:rPr lang="en-SG" sz="1200" dirty="0" smtClean="0">
+                <a:solidFill>
+                  <a:schemeClr val="accent6"/>
+                </a:solidFill>
+              </a:rPr>
+              <a:t>//mapping name</a:t>
+            </a:r>
+          </a:p>
+          <a:p>
+            <a:pPr marL="0" indent="0">
+              <a:buNone/>
+            </a:pPr>
+            <a:r>
+              <a:rPr lang="en-SG" sz="1200" dirty="0" smtClean="0"/>
+              <a:t>"</a:t>
+            </a:r>
+            <a:r>
+              <a:rPr lang="en-SG" sz="1200" dirty="0" err="1" smtClean="0"/>
+              <a:t>dynamic_templates</a:t>
+            </a:r>
+            <a:r>
+              <a:rPr lang="en-SG" sz="1200" dirty="0" smtClean="0"/>
+              <a:t>": [</a:t>
+            </a:r>
+          </a:p>
+          <a:p>
+            <a:pPr marL="457200" lvl="1" indent="0">
+              <a:buNone/>
+            </a:pPr>
+            <a:r>
+              <a:rPr lang="en-SG" sz="800" dirty="0" smtClean="0"/>
+              <a:t>{ "</a:t>
+            </a:r>
+            <a:r>
+              <a:rPr lang="en-SG" sz="800" dirty="0" err="1" smtClean="0">
+                <a:solidFill>
+                  <a:schemeClr val="accent6"/>
+                </a:solidFill>
+              </a:rPr>
+              <a:t>es</a:t>
+            </a:r>
+            <a:r>
+              <a:rPr lang="en-SG" sz="800" dirty="0" smtClean="0"/>
+              <a:t>": { 		</a:t>
+            </a:r>
+            <a:r>
+              <a:rPr lang="en-SG" sz="800" dirty="0" smtClean="0">
+                <a:solidFill>
+                  <a:schemeClr val="accent6"/>
+                </a:solidFill>
+              </a:rPr>
+              <a:t>//template name</a:t>
+            </a:r>
+          </a:p>
+          <a:p>
+            <a:pPr marL="457200" lvl="1" indent="0">
+              <a:buNone/>
+            </a:pPr>
+            <a:r>
+              <a:rPr lang="en-SG" sz="800" dirty="0" smtClean="0"/>
+              <a:t>"match": "*_</a:t>
+            </a:r>
+            <a:r>
+              <a:rPr lang="en-SG" sz="800" dirty="0" err="1" smtClean="0"/>
+              <a:t>es</a:t>
+            </a:r>
+            <a:r>
+              <a:rPr lang="en-SG" sz="800" dirty="0" smtClean="0"/>
+              <a:t>",</a:t>
+            </a:r>
+          </a:p>
+          <a:p>
+            <a:pPr marL="457200" lvl="1" indent="0">
+              <a:buNone/>
+            </a:pPr>
+            <a:r>
+              <a:rPr lang="en-SG" sz="800" dirty="0" smtClean="0"/>
+              <a:t>"</a:t>
+            </a:r>
+            <a:r>
+              <a:rPr lang="en-SG" sz="800" dirty="0" err="1" smtClean="0">
+                <a:solidFill>
+                  <a:schemeClr val="accent6"/>
+                </a:solidFill>
+              </a:rPr>
+              <a:t>match_mapping_type</a:t>
+            </a:r>
+            <a:r>
+              <a:rPr lang="en-SG" sz="800" dirty="0" smtClean="0"/>
+              <a:t>": "</a:t>
+            </a:r>
+            <a:r>
+              <a:rPr lang="en-SG" sz="800" dirty="0" smtClean="0">
+                <a:solidFill>
+                  <a:schemeClr val="accent6"/>
+                </a:solidFill>
+              </a:rPr>
+              <a:t>string</a:t>
+            </a:r>
+            <a:r>
+              <a:rPr lang="en-SG" sz="800" dirty="0" smtClean="0"/>
+              <a:t>", </a:t>
+            </a:r>
+            <a:r>
+              <a:rPr lang="en-SG" sz="800" dirty="0" smtClean="0">
+                <a:solidFill>
+                  <a:schemeClr val="accent6"/>
+                </a:solidFill>
+              </a:rPr>
+              <a:t>//apply the template to fields of the specific type</a:t>
+            </a:r>
+          </a:p>
+          <a:p>
+            <a:pPr marL="457200" lvl="1" indent="0">
+              <a:buNone/>
+            </a:pPr>
+            <a:r>
+              <a:rPr lang="en-SG" sz="800" dirty="0" smtClean="0"/>
+              <a:t>"mapping": {</a:t>
+            </a:r>
+          </a:p>
+          <a:p>
+            <a:pPr marL="457200" lvl="1" indent="0">
+              <a:buNone/>
+            </a:pPr>
+            <a:r>
+              <a:rPr lang="en-SG" sz="800" dirty="0" smtClean="0"/>
+              <a:t>"type": "string",</a:t>
+            </a:r>
+          </a:p>
+          <a:p>
+            <a:pPr marL="457200" lvl="1" indent="0">
+              <a:buNone/>
+            </a:pPr>
+            <a:r>
+              <a:rPr lang="en-SG" sz="800" dirty="0" smtClean="0"/>
+              <a:t>"</a:t>
+            </a:r>
+            <a:r>
+              <a:rPr lang="en-SG" sz="800" dirty="0" err="1" smtClean="0"/>
+              <a:t>analyzer</a:t>
+            </a:r>
+            <a:r>
+              <a:rPr lang="en-SG" sz="800" dirty="0" smtClean="0"/>
+              <a:t>": "</a:t>
+            </a:r>
+            <a:r>
+              <a:rPr lang="en-SG" sz="800" dirty="0" err="1" smtClean="0"/>
+              <a:t>spanish</a:t>
+            </a:r>
+            <a:r>
+              <a:rPr lang="en-SG" sz="800" dirty="0" smtClean="0"/>
+              <a:t>“</a:t>
+            </a:r>
+          </a:p>
+          <a:p>
+            <a:pPr marL="457200" lvl="1" indent="0">
+              <a:buNone/>
+            </a:pPr>
+            <a:r>
+              <a:rPr lang="en-SG" sz="800" dirty="0"/>
+              <a:t>}</a:t>
+            </a:r>
+          </a:p>
+          <a:p>
+            <a:pPr marL="457200" lvl="1" indent="0">
+              <a:buNone/>
+            </a:pPr>
+            <a:r>
+              <a:rPr lang="en-SG" sz="800" dirty="0" smtClean="0"/>
+              <a:t>}}</a:t>
             </a:r>
           </a:p>
           <a:p>
@@ -4336,95 +4406,16 @@
             </a:pPr>
             <a:r>
               <a:rPr lang="en-SG" sz="1200" dirty="0"/>
-              <a:t>PUT /_cluster/settings </a:t>
-            </a:r>
-            <a:endParaRPr lang="en-SG" sz="1200" dirty="0" smtClean="0"/>
-          </a:p>
-          <a:p>
-            <a:pPr marL="0" indent="0">
-              <a:buNone/>
-            </a:pPr>
-            <a:r>
-              <a:rPr lang="en-SG" sz="1200" dirty="0" smtClean="0"/>
-              <a:t>{ </a:t>
-            </a:r>
+              <a:t>]</a:t>
+            </a:r>
+          </a:p>
+          <a:p>
+            <a:pPr marL="0" indent="0">
+              <a:buNone/>
+            </a:pPr>
             <a:r>
               <a:rPr lang="en-SG" sz="1200" dirty="0"/>
-              <a:t>"persistent": { "</a:t>
-            </a:r>
-            <a:r>
-              <a:rPr lang="en-SG" sz="1200" dirty="0" err="1"/>
-              <a:t>cluster.routing.allocation.enable</a:t>
-            </a:r>
-            <a:r>
-              <a:rPr lang="en-SG" sz="1200" dirty="0"/>
-              <a:t>": "none" } }</a:t>
-            </a:r>
-            <a:endParaRPr lang="en-US" sz="1200" dirty="0" smtClean="0"/>
-          </a:p>
-          <a:p>
-            <a:r>
-              <a:rPr lang="en-US" dirty="0" smtClean="0"/>
-              <a:t>Perform a synced flush</a:t>
-            </a:r>
-          </a:p>
-          <a:p>
-            <a:pPr marL="0" indent="0">
-              <a:buNone/>
-            </a:pPr>
-            <a:r>
-              <a:rPr lang="en-SG" sz="1200" dirty="0"/>
-              <a:t>POST /_flush/synced</a:t>
-            </a:r>
-            <a:endParaRPr lang="en-US" sz="1200" dirty="0" smtClean="0"/>
-          </a:p>
-          <a:p>
-            <a:r>
-              <a:rPr lang="en-US" dirty="0" smtClean="0"/>
-              <a:t>Shutdown &amp; upgrade all nodes</a:t>
-            </a:r>
-          </a:p>
-          <a:p>
-            <a:r>
-              <a:rPr lang="en-US" dirty="0" smtClean="0"/>
-              <a:t>Start server </a:t>
-            </a:r>
-          </a:p>
-          <a:p>
-            <a:r>
-              <a:rPr lang="en-US" dirty="0" smtClean="0"/>
-              <a:t>Re-enable shard allocation</a:t>
-            </a:r>
-          </a:p>
-          <a:p>
-            <a:pPr marL="0" indent="0">
-              <a:buNone/>
-            </a:pPr>
-            <a:r>
-              <a:rPr lang="en-SG" sz="1200" dirty="0"/>
-              <a:t>PUT /_cluster/settings </a:t>
-            </a:r>
-            <a:endParaRPr lang="en-SG" sz="1200" dirty="0" smtClean="0"/>
-          </a:p>
-          <a:p>
-            <a:pPr marL="0" indent="0">
-              <a:buNone/>
-            </a:pPr>
-            <a:r>
-              <a:rPr lang="en-SG" sz="1200" dirty="0" smtClean="0"/>
-              <a:t>{ </a:t>
-            </a:r>
-            <a:r>
-              <a:rPr lang="en-SG" sz="1200" dirty="0"/>
-              <a:t>"persistent": { "</a:t>
-            </a:r>
-            <a:r>
-              <a:rPr lang="en-SG" sz="1200" dirty="0" err="1"/>
-              <a:t>cluster.routing.allocation.enable</a:t>
-            </a:r>
-            <a:r>
-              <a:rPr lang="en-SG" sz="1200" dirty="0"/>
-              <a:t>": "all" } }</a:t>
+              <a:t>}}}</a:t>
             </a:r>
           </a:p>
         </p:txBody>
@@ -4432,7 +4423,7 @@
     </p:spTree>
     <p:extLst>
       <p:ext uri="{BB962C8B-B14F-4D97-AF65-F5344CB8AC3E}">
-        <p14:creationId xmlns:p14="http://schemas.microsoft.com/office/powerpoint/2010/main" val="1085262107"/>
+        <p14:creationId xmlns:p14="http://schemas.microsoft.com/office/powerpoint/2010/main" val="2053549167"/>
       </p:ext>
     </p:extLst>
   </p:cSld>
@@ -4476,7 +4467,7 @@
           <a:p>
             <a:r>
               <a:rPr lang="en-US" dirty="0" smtClean="0"/>
-              <a:t>Dynamic Templates</a:t>
+              <a:t>Creating Snapshots and Restore</a:t>
             </a:r>
             <a:endParaRPr lang="en-SG" dirty="0"/>
           </a:p>
@@ -4495,233 +4486,154 @@
         <p:spPr/>
         <p:txBody>
           <a:bodyPr>
-            <a:normAutofit/>
+            <a:normAutofit fontScale="92500" lnSpcReduction="10000"/>
           </a:bodyPr>
           <a:lstStyle/>
           <a:p>
-            <a:pPr marL="0" indent="0">
-              <a:buNone/>
-            </a:pPr>
+            <a:r>
+              <a:rPr lang="en-US" dirty="0" smtClean="0"/>
+              <a:t>Edit the shared filesystem (where snapshots are stored)</a:t>
+            </a:r>
+          </a:p>
+          <a:p>
+            <a:pPr marL="0" indent="0">
+              <a:buNone/>
+            </a:pPr>
+            <a:r>
+              <a:rPr lang="en-SG" sz="1200" dirty="0" err="1" smtClean="0"/>
+              <a:t>elasticsearch.yml</a:t>
+            </a:r>
             <a:r>
               <a:rPr lang="en-SG" sz="1200" dirty="0" smtClean="0"/>
-              <a:t>PUT /</a:t>
+              <a:t> – </a:t>
             </a:r>
             <a:r>
               <a:rPr lang="en-SG" sz="1200" dirty="0" err="1" smtClean="0"/>
-              <a:t>my_index</a:t>
-            </a:r>
-            <a:endParaRPr lang="en-SG" sz="1200" dirty="0" smtClean="0"/>
-          </a:p>
-          <a:p>
-            <a:pPr marL="0" indent="0">
-              <a:buNone/>
-            </a:pPr>
+              <a:t>path.repo</a:t>
+            </a:r>
+            <a:r>
+              <a:rPr lang="en-SG" sz="1200" dirty="0"/>
+              <a:t>: ["/mount/backups", "/mount/</a:t>
+            </a:r>
+            <a:r>
+              <a:rPr lang="en-SG" sz="1200" dirty="0" err="1"/>
+              <a:t>longterm_backups</a:t>
+            </a:r>
             <a:r>
               <a:rPr lang="en-SG" sz="1200" dirty="0" smtClean="0"/>
-              <a:t>{</a:t>
-            </a:r>
-          </a:p>
-          <a:p>
-            <a:pPr marL="0" indent="0">
-              <a:buNone/>
-            </a:pPr>
-            <a:r>
-              <a:rPr lang="en-SG" sz="1200" dirty="0" smtClean="0"/>
-              <a:t>"mappings": {</a:t>
-            </a:r>
-          </a:p>
-          <a:p>
-            <a:pPr marL="0" indent="0">
-              <a:buNone/>
-            </a:pPr>
-            <a:r>
-              <a:rPr lang="en-SG" sz="1200" dirty="0" smtClean="0"/>
-              <a:t>"</a:t>
-            </a:r>
-            <a:r>
-              <a:rPr lang="en-SG" sz="1200" dirty="0" err="1" smtClean="0">
-                <a:solidFill>
-                  <a:schemeClr val="accent6"/>
-                </a:solidFill>
-              </a:rPr>
-              <a:t>my_type</a:t>
-            </a:r>
-            <a:r>
-              <a:rPr lang="en-SG" sz="1200" dirty="0" smtClean="0"/>
-              <a:t>": {		</a:t>
-            </a:r>
-            <a:r>
-              <a:rPr lang="en-SG" sz="1200" dirty="0" smtClean="0">
-                <a:solidFill>
-                  <a:schemeClr val="accent6"/>
-                </a:solidFill>
-              </a:rPr>
-              <a:t>//mapping name</a:t>
-            </a:r>
-          </a:p>
-          <a:p>
-            <a:pPr marL="0" indent="0">
-              <a:buNone/>
-            </a:pPr>
-            <a:r>
-              <a:rPr lang="en-SG" sz="1200" dirty="0" smtClean="0"/>
-              <a:t>"</a:t>
-            </a:r>
-            <a:r>
-              <a:rPr lang="en-SG" sz="1200" dirty="0" err="1" smtClean="0"/>
-              <a:t>dynamic_templates</a:t>
-            </a:r>
-            <a:r>
-              <a:rPr lang="en-SG" sz="1200" dirty="0" smtClean="0"/>
-              <a:t>": [</a:t>
-            </a:r>
-          </a:p>
-          <a:p>
-            <a:pPr marL="457200" lvl="1" indent="0">
-              <a:buNone/>
-            </a:pPr>
-            <a:r>
-              <a:rPr lang="en-SG" sz="800" dirty="0" smtClean="0"/>
-              <a:t>{ "</a:t>
-            </a:r>
-            <a:r>
-              <a:rPr lang="en-SG" sz="800" dirty="0" err="1" smtClean="0">
-                <a:solidFill>
-                  <a:schemeClr val="accent6"/>
-                </a:solidFill>
-              </a:rPr>
-              <a:t>es</a:t>
-            </a:r>
-            <a:r>
-              <a:rPr lang="en-SG" sz="800" dirty="0" smtClean="0"/>
-              <a:t>": { 		</a:t>
-            </a:r>
-            <a:r>
-              <a:rPr lang="en-SG" sz="800" dirty="0" smtClean="0">
-                <a:solidFill>
-                  <a:schemeClr val="accent6"/>
-                </a:solidFill>
-              </a:rPr>
-              <a:t>//template name</a:t>
-            </a:r>
-          </a:p>
-          <a:p>
-            <a:pPr marL="457200" lvl="1" indent="0">
-              <a:buNone/>
-            </a:pPr>
-            <a:r>
-              <a:rPr lang="en-SG" sz="800" dirty="0" smtClean="0"/>
-              <a:t>"match": "*_</a:t>
-            </a:r>
-            <a:r>
-              <a:rPr lang="en-SG" sz="800" dirty="0" err="1" smtClean="0"/>
-              <a:t>es</a:t>
-            </a:r>
-            <a:r>
-              <a:rPr lang="en-SG" sz="800" dirty="0" smtClean="0"/>
-              <a:t>",</a:t>
-            </a:r>
-          </a:p>
-          <a:p>
-            <a:pPr marL="457200" lvl="1" indent="0">
-              <a:buNone/>
-            </a:pPr>
-            <a:r>
-              <a:rPr lang="en-SG" sz="800" dirty="0" smtClean="0"/>
-              <a:t>"</a:t>
-            </a:r>
-            <a:r>
-              <a:rPr lang="en-SG" sz="800" dirty="0" err="1" smtClean="0">
-                <a:solidFill>
-                  <a:schemeClr val="accent6"/>
-                </a:solidFill>
-              </a:rPr>
-              <a:t>match_mapping_type</a:t>
-            </a:r>
-            <a:r>
-              <a:rPr lang="en-SG" sz="800" dirty="0" smtClean="0"/>
-              <a:t>": "</a:t>
-            </a:r>
-            <a:r>
-              <a:rPr lang="en-SG" sz="800" dirty="0" smtClean="0">
-                <a:solidFill>
-                  <a:schemeClr val="accent6"/>
-                </a:solidFill>
-              </a:rPr>
-              <a:t>string</a:t>
-            </a:r>
-            <a:r>
-              <a:rPr lang="en-SG" sz="800" dirty="0" smtClean="0"/>
-              <a:t>", </a:t>
-            </a:r>
-            <a:r>
-              <a:rPr lang="en-SG" sz="800" dirty="0" smtClean="0">
-                <a:solidFill>
-                  <a:schemeClr val="accent6"/>
-                </a:solidFill>
-              </a:rPr>
-              <a:t>//apply the template to fields of the specific type</a:t>
-            </a:r>
-          </a:p>
-          <a:p>
-            <a:pPr marL="457200" lvl="1" indent="0">
-              <a:buNone/>
-            </a:pPr>
-            <a:r>
-              <a:rPr lang="en-SG" sz="800" dirty="0" smtClean="0"/>
-              <a:t>"mapping": {</a:t>
-            </a:r>
-          </a:p>
-          <a:p>
-            <a:pPr marL="457200" lvl="1" indent="0">
-              <a:buNone/>
-            </a:pPr>
-            <a:r>
-              <a:rPr lang="en-SG" sz="800" dirty="0" smtClean="0"/>
-              <a:t>"type": "string",</a:t>
-            </a:r>
-          </a:p>
-          <a:p>
-            <a:pPr marL="457200" lvl="1" indent="0">
-              <a:buNone/>
-            </a:pPr>
-            <a:r>
-              <a:rPr lang="en-SG" sz="800" dirty="0" smtClean="0"/>
-              <a:t>"</a:t>
-            </a:r>
-            <a:r>
-              <a:rPr lang="en-SG" sz="800" dirty="0" err="1" smtClean="0"/>
-              <a:t>analyzer</a:t>
-            </a:r>
-            <a:r>
-              <a:rPr lang="en-SG" sz="800" dirty="0" smtClean="0"/>
-              <a:t>": "</a:t>
-            </a:r>
-            <a:r>
-              <a:rPr lang="en-SG" sz="800" dirty="0" err="1" smtClean="0"/>
-              <a:t>spanish</a:t>
-            </a:r>
-            <a:r>
-              <a:rPr lang="en-SG" sz="800" dirty="0" smtClean="0"/>
-              <a:t>“</a:t>
-            </a:r>
-          </a:p>
-          <a:p>
-            <a:pPr marL="457200" lvl="1" indent="0">
-              <a:buNone/>
-            </a:pPr>
-            <a:r>
-              <a:rPr lang="en-SG" sz="800" dirty="0"/>
-              <a:t>}</a:t>
-            </a:r>
-          </a:p>
-          <a:p>
-            <a:pPr marL="457200" lvl="1" indent="0">
-              <a:buNone/>
-            </a:pPr>
-            <a:r>
-              <a:rPr lang="en-SG" sz="800" dirty="0" smtClean="0"/>
-              <a:t>}}</a:t>
+              <a:t>"]</a:t>
+            </a:r>
+            <a:endParaRPr lang="en-US" sz="1200" dirty="0" smtClean="0"/>
+          </a:p>
+          <a:p>
+            <a:r>
+              <a:rPr lang="en-US" dirty="0" smtClean="0"/>
+              <a:t>Register the shared filesystem with the snapshot</a:t>
+            </a:r>
+          </a:p>
+          <a:p>
+            <a:pPr marL="0" indent="0">
+              <a:buNone/>
+            </a:pPr>
+            <a:r>
+              <a:rPr lang="en-SG" sz="1300" dirty="0" smtClean="0"/>
+              <a:t>PUT /_snapshot/</a:t>
+            </a:r>
+            <a:r>
+              <a:rPr lang="en-SG" sz="1300" dirty="0" err="1" smtClean="0"/>
+              <a:t>my_backup</a:t>
+            </a:r>
+            <a:endParaRPr lang="en-SG" sz="1300" dirty="0" smtClean="0"/>
+          </a:p>
+          <a:p>
+            <a:pPr marL="0" indent="0">
+              <a:buNone/>
+            </a:pPr>
+            <a:r>
+              <a:rPr lang="en-SG" sz="1300" dirty="0" smtClean="0"/>
+              <a:t> { </a:t>
+            </a:r>
+            <a:r>
+              <a:rPr lang="en-SG" sz="1300" dirty="0"/>
+              <a:t>"type": "fs", </a:t>
+            </a:r>
+            <a:endParaRPr lang="en-SG" sz="1300" dirty="0" smtClean="0"/>
+          </a:p>
+          <a:p>
+            <a:pPr marL="0" indent="0">
+              <a:buNone/>
+            </a:pPr>
+            <a:r>
+              <a:rPr lang="en-SG" sz="1300" dirty="0"/>
+              <a:t> </a:t>
+            </a:r>
+            <a:r>
+              <a:rPr lang="en-SG" sz="1300" dirty="0" smtClean="0"/>
+              <a:t>   "</a:t>
+            </a:r>
+            <a:r>
+              <a:rPr lang="en-SG" sz="1300" dirty="0"/>
+              <a:t>settings": { </a:t>
+            </a:r>
+            <a:endParaRPr lang="en-SG" sz="1300" dirty="0" smtClean="0"/>
+          </a:p>
+          <a:p>
+            <a:pPr marL="0" indent="0">
+              <a:buNone/>
+            </a:pPr>
+            <a:r>
+              <a:rPr lang="en-SG" sz="1300" dirty="0"/>
+              <a:t> </a:t>
+            </a:r>
+            <a:r>
+              <a:rPr lang="en-SG" sz="1300" dirty="0" smtClean="0"/>
+              <a:t>       "</a:t>
+            </a:r>
+            <a:r>
+              <a:rPr lang="en-SG" sz="1300" dirty="0"/>
+              <a:t>location": "/mount/backups/</a:t>
+            </a:r>
+            <a:r>
+              <a:rPr lang="en-SG" sz="1300" dirty="0" err="1"/>
+              <a:t>my_backup</a:t>
+            </a:r>
+            <a:r>
+              <a:rPr lang="en-SG" sz="1300" dirty="0"/>
+              <a:t>", "compress": true </a:t>
+            </a:r>
+            <a:endParaRPr lang="en-SG" sz="1300" dirty="0" smtClean="0"/>
+          </a:p>
+          <a:p>
+            <a:pPr marL="0" indent="0">
+              <a:buNone/>
+            </a:pPr>
+            <a:r>
+              <a:rPr lang="en-SG" sz="1300" dirty="0"/>
+              <a:t> </a:t>
+            </a:r>
+            <a:r>
+              <a:rPr lang="en-SG" sz="1300" dirty="0" smtClean="0"/>
+              <a:t>     } </a:t>
+            </a:r>
+          </a:p>
+          <a:p>
+            <a:pPr marL="0" indent="0">
+              <a:buNone/>
+            </a:pPr>
+            <a:r>
+              <a:rPr lang="en-SG" sz="1300" dirty="0"/>
+              <a:t> </a:t>
+            </a:r>
+            <a:r>
+              <a:rPr lang="en-SG" sz="1300" dirty="0" smtClean="0"/>
+              <a:t> }</a:t>
+            </a:r>
+            <a:endParaRPr lang="en-US" sz="1300" dirty="0" smtClean="0"/>
+          </a:p>
+          <a:p>
+            <a:r>
+              <a:rPr lang="en-US" dirty="0" smtClean="0"/>
+              <a:t>Create the snapshot</a:t>
             </a:r>
           </a:p>
           <a:p>
@@ -4730,16 +4642,39 @@
             </a:pPr>
             <a:r>
               <a:rPr lang="en-SG" sz="1200" dirty="0"/>
-              <a:t>]</a:t>
-            </a:r>
-          </a:p>
-          <a:p>
-            <a:pPr marL="0" indent="0">
-              <a:buNone/>
-            </a:pPr>
+              <a:t>PUT /_snapshot/</a:t>
+            </a:r>
+            <a:r>
+              <a:rPr lang="en-SG" sz="1200" dirty="0" err="1"/>
+              <a:t>my_backup</a:t>
+            </a:r>
             <a:r>
               <a:rPr lang="en-SG" sz="1200" dirty="0"/>
-              <a:t>}}}</a:t>
+              <a:t>/snapshot_1?wait_for_completion=true</a:t>
+            </a:r>
+            <a:endParaRPr lang="en-US" sz="1200" dirty="0" smtClean="0"/>
+          </a:p>
+          <a:p>
+            <a:r>
+              <a:rPr lang="en-US" dirty="0" smtClean="0"/>
+              <a:t>Restore the snapshot</a:t>
+            </a:r>
+          </a:p>
+          <a:p>
+            <a:pPr marL="0" indent="0">
+              <a:buNone/>
+            </a:pPr>
+            <a:r>
+              <a:rPr lang="en-SG" sz="1200" dirty="0"/>
+              <a:t>POST /_snapshot/</a:t>
+            </a:r>
+            <a:r>
+              <a:rPr lang="en-SG" sz="1200" dirty="0" err="1"/>
+              <a:t>my_backup</a:t>
+            </a:r>
+            <a:r>
+              <a:rPr lang="en-SG" sz="1200" dirty="0"/>
+              <a:t>/snapshot_1/_restore</a:t>
             </a:r>
           </a:p>
         </p:txBody>
@@ -4747,7 +4682,7 @@
     </p:spTree>
     <p:extLst>
       <p:ext uri="{BB962C8B-B14F-4D97-AF65-F5344CB8AC3E}">
-        <p14:creationId xmlns:p14="http://schemas.microsoft.com/office/powerpoint/2010/main" val="2053549167"/>
+        <p14:creationId xmlns:p14="http://schemas.microsoft.com/office/powerpoint/2010/main" val="1029645993"/>
       </p:ext>
     </p:extLst>
   </p:cSld>
@@ -4791,7 +4726,7 @@
           <a:p>
             <a:r>
               <a:rPr lang="en-US" dirty="0" smtClean="0"/>
-              <a:t>Template for _id pattern</a:t>
+              <a:t>Upgrading (from 1.x to 2.x)</a:t>
             </a:r>
             <a:endParaRPr lang="en-SG" dirty="0"/>
           </a:p>
@@ -4809,17 +4744,119 @@
         </p:nvSpPr>
         <p:spPr/>
         <p:txBody>
-          <a:bodyPr/>
-          <a:lstStyle/>
-          <a:p>
-            <a:endParaRPr lang="en-SG"/>
+          <a:bodyPr>
+            <a:normAutofit/>
+          </a:bodyPr>
+          <a:lstStyle/>
+          <a:p>
+            <a:r>
+              <a:rPr lang="en-US" dirty="0" smtClean="0"/>
+              <a:t>Disable shard allocation</a:t>
+            </a:r>
+          </a:p>
+          <a:p>
+            <a:pPr marL="0" indent="0">
+              <a:buNone/>
+            </a:pPr>
+            <a:r>
+              <a:rPr lang="en-SG" sz="1200" dirty="0"/>
+              <a:t>PUT /_cluster/settings </a:t>
+            </a:r>
+            <a:endParaRPr lang="en-SG" sz="1200" dirty="0" smtClean="0"/>
+          </a:p>
+          <a:p>
+            <a:pPr marL="0" indent="0">
+              <a:buNone/>
+            </a:pPr>
+            <a:r>
+              <a:rPr lang="en-SG" sz="1200" dirty="0" smtClean="0"/>
+              <a:t>{ </a:t>
+            </a:r>
+            <a:r>
+              <a:rPr lang="en-SG" sz="1200" dirty="0"/>
+              <a:t>"persistent": { "</a:t>
+            </a:r>
+            <a:r>
+              <a:rPr lang="en-SG" sz="1200" dirty="0" err="1"/>
+              <a:t>cluster.routing.allocation.enable</a:t>
+            </a:r>
+            <a:r>
+              <a:rPr lang="en-SG" sz="1200" dirty="0"/>
+              <a:t>": "none" } }</a:t>
+            </a:r>
+            <a:endParaRPr lang="en-US" sz="1200" dirty="0" smtClean="0"/>
+          </a:p>
+          <a:p>
+            <a:r>
+              <a:rPr lang="en-US" dirty="0" smtClean="0"/>
+              <a:t>Perform a synced flush</a:t>
+            </a:r>
+          </a:p>
+          <a:p>
+            <a:pPr marL="0" indent="0">
+              <a:buNone/>
+            </a:pPr>
+            <a:r>
+              <a:rPr lang="en-SG" sz="1200" dirty="0"/>
+              <a:t>POST /_flush/synced</a:t>
+            </a:r>
+            <a:endParaRPr lang="en-US" sz="1200" dirty="0" smtClean="0"/>
+          </a:p>
+          <a:p>
+            <a:r>
+              <a:rPr lang="en-US" dirty="0" smtClean="0"/>
+              <a:t>Shutdown &amp; upgrade all nodes</a:t>
+            </a:r>
+          </a:p>
+          <a:p>
+            <a:r>
+              <a:rPr lang="en-US" dirty="0" smtClean="0"/>
+              <a:t>Start server </a:t>
+            </a:r>
+          </a:p>
+          <a:p>
+            <a:r>
+              <a:rPr lang="en-US" dirty="0" smtClean="0"/>
+              <a:t>Re-enable shard allocation</a:t>
+            </a:r>
+          </a:p>
+          <a:p>
+            <a:pPr marL="0" indent="0">
+              <a:buNone/>
+            </a:pPr>
+            <a:r>
+              <a:rPr lang="en-SG" sz="1200" dirty="0"/>
+              <a:t>PUT /_cluster/settings </a:t>
+            </a:r>
+            <a:endParaRPr lang="en-SG" sz="1200" dirty="0" smtClean="0"/>
+          </a:p>
+          <a:p>
+            <a:pPr marL="0" indent="0">
+              <a:buNone/>
+            </a:pPr>
+            <a:r>
+              <a:rPr lang="en-SG" sz="1200" dirty="0" smtClean="0"/>
+              <a:t>{ </a:t>
+            </a:r>
+            <a:r>
+              <a:rPr lang="en-SG" sz="1200" dirty="0"/>
+              <a:t>"persistent": { "</a:t>
+            </a:r>
+            <a:r>
+              <a:rPr lang="en-SG" sz="1200" dirty="0" err="1"/>
+              <a:t>cluster.routing.allocation.enable</a:t>
+            </a:r>
+            <a:r>
+              <a:rPr lang="en-SG" sz="1200" dirty="0"/>
+              <a:t>": "all" } }</a:t>
+            </a:r>
           </a:p>
         </p:txBody>
       </p:sp>
     </p:spTree>
     <p:extLst>
       <p:ext uri="{BB962C8B-B14F-4D97-AF65-F5344CB8AC3E}">
-        <p14:creationId xmlns:p14="http://schemas.microsoft.com/office/powerpoint/2010/main" val="804292178"/>
+        <p14:creationId xmlns:p14="http://schemas.microsoft.com/office/powerpoint/2010/main" val="1085262107"/>
       </p:ext>
     </p:extLst>
   </p:cSld>
@@ -5103,8 +5140,13 @@
           <a:p>
             <a:r>
               <a:rPr lang="en-US" dirty="0" smtClean="0"/>
-              <a:t>Full Text/unstructured – textual data (more of a human form, fuzzier)</a:t>
-            </a:r>
+              <a:t>Full Text/unstructured – textual data (more of a human form</a:t>
+            </a:r>
+            <a:r>
+              <a:rPr lang="en-US" dirty="0" smtClean="0"/>
+              <a:t>, for fuzzier analysis)</a:t>
+            </a:r>
+            <a:endParaRPr lang="en-US" dirty="0" smtClean="0"/>
           </a:p>
           <a:p>
             <a:r>
@@ -5742,7 +5784,23 @@
             </a:pPr>
             <a:r>
               <a:rPr lang="en-US" sz="1400" dirty="0" smtClean="0"/>
-              <a:t>If you do not know which field you are searching. It may return false positives!</a:t>
+              <a:t>If you do not know which field you are </a:t>
+            </a:r>
+            <a:r>
+              <a:rPr lang="en-US" sz="1400" dirty="0" smtClean="0"/>
+              <a:t>searching, then you can try the _all field. However, it </a:t>
+            </a:r>
+            <a:r>
+              <a:rPr lang="en-US" sz="1400" dirty="0" smtClean="0"/>
+              <a:t>may return </a:t>
+            </a:r>
+            <a:r>
+              <a:rPr lang="en-US" sz="1400" dirty="0" smtClean="0"/>
+              <a:t>many false </a:t>
+            </a:r>
+            <a:r>
+              <a:rPr lang="en-US" sz="1400" dirty="0" smtClean="0"/>
+              <a:t>positives!</a:t>
             </a:r>
             <a:endParaRPr lang="en-SG" sz="1400" dirty="0"/>
           </a:p>
@@ -6922,13 +6980,17 @@
         </p:spPr>
         <p:txBody>
           <a:bodyPr>
-            <a:normAutofit lnSpcReduction="10000"/>
+            <a:normAutofit fontScale="92500" lnSpcReduction="20000"/>
           </a:bodyPr>
           <a:lstStyle/>
           <a:p>
             <a:r>
               <a:rPr lang="en-US" sz="4000" dirty="0" smtClean="0"/>
-              <a:t>Add the mapping later</a:t>
+              <a:t>Or you can Add </a:t>
+            </a:r>
+            <a:r>
+              <a:rPr lang="en-US" sz="4000" dirty="0" smtClean="0"/>
+              <a:t>the mapping later</a:t>
             </a:r>
           </a:p>
           <a:p>
@@ -7032,7 +7094,19 @@
           <a:p>
             <a:r>
               <a:rPr lang="en-US" dirty="0" smtClean="0"/>
-              <a:t>You can’t change the mapping if it is already defined. Even though you can use the above command, if the string has been analyzed, the searchable result may not be correct.</a:t>
+              <a:t>You can’t change the mapping if it is already defined. Even though you can use the above </a:t>
+            </a:r>
+            <a:r>
+              <a:rPr lang="en-US" dirty="0" smtClean="0"/>
+              <a:t>command (with index set to analyzed), </a:t>
+            </a:r>
+            <a:r>
+              <a:rPr lang="en-US" dirty="0" smtClean="0"/>
+              <a:t>if the string has been analyzed, the searchable result may not be </a:t>
+            </a:r>
+            <a:r>
+              <a:rPr lang="en-US" dirty="0" smtClean="0"/>
+              <a:t>correct (due to the inverted index processing).</a:t>
             </a:r>
             <a:endParaRPr lang="en-SG" dirty="0"/>
           </a:p>

</xml_diff>